<commit_message>
added labs at the end of bots logging
</commit_message>
<xml_diff>
--- a/Instructor-Resources/Slides/BotsLogging.pptx
+++ b/Instructor-Resources/Slides/BotsLogging.pptx
@@ -11,10 +11,10 @@
     <p:sldMasterId id="2147484552" r:id="rId10"/>
   </p:sldMasterIdLst>
   <p:notesMasterIdLst>
-    <p:notesMasterId r:id="rId19"/>
+    <p:notesMasterId r:id="rId20"/>
   </p:notesMasterIdLst>
   <p:handoutMasterIdLst>
-    <p:handoutMasterId r:id="rId20"/>
+    <p:handoutMasterId r:id="rId21"/>
   </p:handoutMasterIdLst>
   <p:sldIdLst>
     <p:sldId id="1656" r:id="rId11"/>
@@ -25,6 +25,7 @@
     <p:sldId id="1662" r:id="rId16"/>
     <p:sldId id="1661" r:id="rId17"/>
     <p:sldId id="1663" r:id="rId18"/>
+    <p:sldId id="1665" r:id="rId19"/>
   </p:sldIdLst>
   <p:sldSz cx="12436475" cy="6994525"/>
   <p:notesSz cx="6858000" cy="9144000"/>
@@ -252,7 +253,7 @@
               <a:rPr lang="en-US" smtClean="0">
                 <a:latin typeface="Segoe UI" pitchFamily="34" charset="0"/>
               </a:rPr>
-              <a:t>7/16/2017 11:53 PM</a:t>
+              <a:t>11/28/2017 7:13 AM</a:t>
             </a:fld>
             <a:endParaRPr lang="en-US" dirty="0">
               <a:latin typeface="Segoe UI" pitchFamily="34" charset="0"/>
@@ -874,7 +875,7 @@
           <a:p>
             <a:fld id="{76931AD4-DA52-48E2-8CE7-602C7D2886AD}" type="datetime8">
               <a:rPr lang="en-US" smtClean="0"/>
-              <a:t>7/16/2017 11:37 PM</a:t>
+              <a:t>11/28/2017 7:12 AM</a:t>
             </a:fld>
             <a:endParaRPr lang="en-US" dirty="0"/>
           </a:p>
@@ -1503,6 +1504,191 @@
     <p:extLst>
       <p:ext uri="{BB962C8B-B14F-4D97-AF65-F5344CB8AC3E}">
         <p14:creationId xmlns:p14="http://schemas.microsoft.com/office/powerpoint/2010/main" val="1973373049"/>
+      </p:ext>
+    </p:extLst>
+  </p:cSld>
+  <p:clrMapOvr>
+    <a:masterClrMapping/>
+  </p:clrMapOvr>
+</p:notes>
+</file>
+
+<file path=ppt/notesSlides/notesSlide9.xml><?xml version="1.0" encoding="utf-8"?>
+<p:notes xmlns:a="http://schemas.openxmlformats.org/drawingml/2006/main" xmlns:r="http://schemas.openxmlformats.org/officeDocument/2006/relationships" xmlns:p="http://schemas.openxmlformats.org/presentationml/2006/main">
+  <p:cSld>
+    <p:spTree>
+      <p:nvGrpSpPr>
+        <p:cNvPr id="1" name=""/>
+        <p:cNvGrpSpPr/>
+        <p:nvPr/>
+      </p:nvGrpSpPr>
+      <p:grpSpPr>
+        <a:xfrm>
+          <a:off x="0" y="0"/>
+          <a:ext cx="0" cy="0"/>
+          <a:chOff x="0" y="0"/>
+          <a:chExt cx="0" cy="0"/>
+        </a:xfrm>
+      </p:grpSpPr>
+      <p:sp>
+        <p:nvSpPr>
+          <p:cNvPr id="2" name="Slide Image Placeholder 1"/>
+          <p:cNvSpPr>
+            <a:spLocks noGrp="1" noRot="1" noChangeAspect="1"/>
+          </p:cNvSpPr>
+          <p:nvPr>
+            <p:ph type="sldImg"/>
+          </p:nvPr>
+        </p:nvSpPr>
+        <p:spPr/>
+      </p:sp>
+      <p:sp>
+        <p:nvSpPr>
+          <p:cNvPr id="3" name="Notes Placeholder 2"/>
+          <p:cNvSpPr>
+            <a:spLocks noGrp="1"/>
+          </p:cNvSpPr>
+          <p:nvPr>
+            <p:ph type="body" idx="1"/>
+          </p:nvPr>
+        </p:nvSpPr>
+        <p:spPr/>
+        <p:txBody>
+          <a:bodyPr/>
+          <a:lstStyle/>
+          <a:p>
+            <a:endParaRPr lang="en-US"/>
+          </a:p>
+        </p:txBody>
+      </p:sp>
+      <p:sp>
+        <p:nvSpPr>
+          <p:cNvPr id="4" name="Header Placeholder 3"/>
+          <p:cNvSpPr>
+            <a:spLocks noGrp="1"/>
+          </p:cNvSpPr>
+          <p:nvPr>
+            <p:ph type="hdr" sz="quarter" idx="10"/>
+          </p:nvPr>
+        </p:nvSpPr>
+        <p:spPr/>
+        <p:txBody>
+          <a:bodyPr/>
+          <a:lstStyle/>
+          <a:p>
+            <a:r>
+              <a:rPr lang="en-US"/>
+              <a:t>Machine Learning, Analytics, &amp; Data Science Conference</a:t>
+            </a:r>
+            <a:endParaRPr lang="en-US" dirty="0"/>
+          </a:p>
+        </p:txBody>
+      </p:sp>
+      <p:sp>
+        <p:nvSpPr>
+          <p:cNvPr id="5" name="Footer Placeholder 4"/>
+          <p:cNvSpPr>
+            <a:spLocks noGrp="1"/>
+          </p:cNvSpPr>
+          <p:nvPr>
+            <p:ph type="ftr" sz="quarter" idx="11"/>
+          </p:nvPr>
+        </p:nvSpPr>
+        <p:spPr/>
+        <p:txBody>
+          <a:bodyPr/>
+          <a:lstStyle/>
+          <a:p>
+            <a:pPr defTabSz="931467" eaLnBrk="0" hangingPunct="0"/>
+            <a:r>
+              <a:rPr lang="en-US" sz="400">
+                <a:gradFill>
+                  <a:gsLst>
+                    <a:gs pos="0">
+                      <a:prstClr val="black"/>
+                    </a:gs>
+                    <a:gs pos="100000">
+                      <a:prstClr val="black"/>
+                    </a:gs>
+                  </a:gsLst>
+                  <a:lin ang="5400000" scaled="0"/>
+                </a:gradFill>
+                <a:latin typeface="Segoe UI" pitchFamily="34" charset="0"/>
+                <a:ea typeface="Segoe UI" pitchFamily="34" charset="0"/>
+                <a:cs typeface="Segoe UI" pitchFamily="34" charset="0"/>
+              </a:rPr>
+              <a:t>© 2016 Microsoft Corporation. All rights reserved. MICROSOFT MAKES NO WARRANTIES, EXPRESS, IMPLIED OR STATUTORY, AS TO THE INFORMATION IN THIS PRESENTATION.</a:t>
+            </a:r>
+            <a:endParaRPr lang="en-US" sz="400" dirty="0">
+              <a:gradFill>
+                <a:gsLst>
+                  <a:gs pos="0">
+                    <a:prstClr val="black"/>
+                  </a:gs>
+                  <a:gs pos="100000">
+                    <a:prstClr val="black"/>
+                  </a:gs>
+                </a:gsLst>
+                <a:lin ang="5400000" scaled="0"/>
+              </a:gradFill>
+              <a:latin typeface="Segoe UI" pitchFamily="34" charset="0"/>
+              <a:ea typeface="Segoe UI" pitchFamily="34" charset="0"/>
+              <a:cs typeface="Segoe UI" pitchFamily="34" charset="0"/>
+            </a:endParaRPr>
+          </a:p>
+        </p:txBody>
+      </p:sp>
+      <p:sp>
+        <p:nvSpPr>
+          <p:cNvPr id="6" name="Date Placeholder 5"/>
+          <p:cNvSpPr>
+            <a:spLocks noGrp="1"/>
+          </p:cNvSpPr>
+          <p:nvPr>
+            <p:ph type="dt" idx="12"/>
+          </p:nvPr>
+        </p:nvSpPr>
+        <p:spPr/>
+        <p:txBody>
+          <a:bodyPr/>
+          <a:lstStyle/>
+          <a:p>
+            <a:fld id="{A02ADDEA-1593-4BF6-82FC-4D1690AE5C33}" type="datetime8">
+              <a:rPr lang="en-US" smtClean="0"/>
+              <a:t>11/28/2017 7:15 AM</a:t>
+            </a:fld>
+            <a:endParaRPr lang="en-US" dirty="0"/>
+          </a:p>
+        </p:txBody>
+      </p:sp>
+      <p:sp>
+        <p:nvSpPr>
+          <p:cNvPr id="7" name="Slide Number Placeholder 6"/>
+          <p:cNvSpPr>
+            <a:spLocks noGrp="1"/>
+          </p:cNvSpPr>
+          <p:nvPr>
+            <p:ph type="sldNum" sz="quarter" idx="13"/>
+          </p:nvPr>
+        </p:nvSpPr>
+        <p:spPr/>
+        <p:txBody>
+          <a:bodyPr/>
+          <a:lstStyle/>
+          <a:p>
+            <a:fld id="{B4008EB6-D09E-4580-8CD6-DDB14511944F}" type="slidenum">
+              <a:rPr lang="en-US" smtClean="0"/>
+              <a:pPr/>
+              <a:t>9</a:t>
+            </a:fld>
+            <a:endParaRPr lang="en-US" dirty="0"/>
+          </a:p>
+        </p:txBody>
+      </p:sp>
+    </p:spTree>
+    <p:extLst>
+      <p:ext uri="{BB962C8B-B14F-4D97-AF65-F5344CB8AC3E}">
+        <p14:creationId xmlns:p14="http://schemas.microsoft.com/office/powerpoint/2010/main" val="804899608"/>
       </p:ext>
     </p:extLst>
   </p:cSld>
@@ -13370,7 +13556,7 @@
                 </a:solidFill>
               </a:rPr>
               <a:pPr defTabSz="932418"/>
-              <a:t>7/16/2017</a:t>
+              <a:t>11/28/2017</a:t>
             </a:fld>
             <a:endParaRPr lang="en-US" dirty="0">
               <a:solidFill>
@@ -17285,6 +17471,395 @@
     <p:extLst>
       <p:ext uri="{BB962C8B-B14F-4D97-AF65-F5344CB8AC3E}">
         <p14:creationId xmlns:p14="http://schemas.microsoft.com/office/powerpoint/2010/main" val="3151713297"/>
+      </p:ext>
+    </p:extLst>
+  </p:cSld>
+  <p:clrMapOvr>
+    <a:masterClrMapping/>
+  </p:clrMapOvr>
+  <p:transition>
+    <p:fade/>
+  </p:transition>
+</p:sldLayout>
+</file>
+
+<file path=ppt/slideLayouts/slideLayout83.xml><?xml version="1.0" encoding="utf-8"?>
+<p:sldLayout xmlns:a="http://schemas.openxmlformats.org/drawingml/2006/main" xmlns:r="http://schemas.openxmlformats.org/officeDocument/2006/relationships" xmlns:p="http://schemas.openxmlformats.org/presentationml/2006/main" userDrawn="1">
+  <p:cSld name="Split code and points">
+    <p:spTree>
+      <p:nvGrpSpPr>
+        <p:cNvPr id="1" name=""/>
+        <p:cNvGrpSpPr/>
+        <p:nvPr/>
+      </p:nvGrpSpPr>
+      <p:grpSpPr>
+        <a:xfrm>
+          <a:off x="0" y="0"/>
+          <a:ext cx="0" cy="0"/>
+          <a:chOff x="0" y="0"/>
+          <a:chExt cx="0" cy="0"/>
+        </a:xfrm>
+      </p:grpSpPr>
+      <p:sp>
+        <p:nvSpPr>
+          <p:cNvPr id="2" name="Title 1"/>
+          <p:cNvSpPr>
+            <a:spLocks noGrp="1"/>
+          </p:cNvSpPr>
+          <p:nvPr>
+            <p:ph type="title" hasCustomPrompt="1"/>
+          </p:nvPr>
+        </p:nvSpPr>
+        <p:spPr>
+          <a:xfrm>
+            <a:off x="274639" y="295275"/>
+            <a:ext cx="7114249" cy="917575"/>
+          </a:xfrm>
+        </p:spPr>
+        <p:txBody>
+          <a:bodyPr/>
+          <a:lstStyle>
+            <a:lvl1pPr>
+              <a:defRPr baseline="0"/>
+            </a:lvl1pPr>
+          </a:lstStyle>
+          <a:p>
+            <a:r>
+              <a:rPr lang="en-US" dirty="0"/>
+              <a:t>Slide for developer code</a:t>
+            </a:r>
+          </a:p>
+        </p:txBody>
+      </p:sp>
+      <p:sp>
+        <p:nvSpPr>
+          <p:cNvPr id="5" name="Text Placeholder 4"/>
+          <p:cNvSpPr>
+            <a:spLocks noGrp="1"/>
+          </p:cNvSpPr>
+          <p:nvPr>
+            <p:ph type="body" sz="quarter" idx="10"/>
+          </p:nvPr>
+        </p:nvSpPr>
+        <p:spPr>
+          <a:xfrm>
+            <a:off x="274637" y="1221158"/>
+            <a:ext cx="7114250" cy="1654271"/>
+          </a:xfrm>
+        </p:spPr>
+        <p:txBody>
+          <a:bodyPr/>
+          <a:lstStyle>
+            <a:lvl1pPr marL="0" indent="0">
+              <a:buNone/>
+              <a:defRPr sz="2856">
+                <a:gradFill>
+                  <a:gsLst>
+                    <a:gs pos="1250">
+                      <a:srgbClr val="000000"/>
+                    </a:gs>
+                    <a:gs pos="100000">
+                      <a:srgbClr val="000000"/>
+                    </a:gs>
+                  </a:gsLst>
+                  <a:lin ang="5400000" scaled="0"/>
+                </a:gradFill>
+                <a:latin typeface="Consolas" panose="020B0609020204030204" pitchFamily="49" charset="0"/>
+                <a:cs typeface="Consolas" panose="020B0609020204030204" pitchFamily="49" charset="0"/>
+              </a:defRPr>
+            </a:lvl1pPr>
+            <a:lvl2pPr marL="346487" indent="0">
+              <a:buNone/>
+              <a:defRPr sz="1836">
+                <a:gradFill>
+                  <a:gsLst>
+                    <a:gs pos="1250">
+                      <a:srgbClr val="000000"/>
+                    </a:gs>
+                    <a:gs pos="100000">
+                      <a:srgbClr val="000000"/>
+                    </a:gs>
+                  </a:gsLst>
+                  <a:lin ang="5400000" scaled="0"/>
+                </a:gradFill>
+                <a:latin typeface="Consolas" panose="020B0609020204030204" pitchFamily="49" charset="0"/>
+                <a:cs typeface="Consolas" panose="020B0609020204030204" pitchFamily="49" charset="0"/>
+              </a:defRPr>
+            </a:lvl2pPr>
+            <a:lvl3pPr marL="584494" indent="0">
+              <a:buNone/>
+              <a:defRPr sz="1632">
+                <a:gradFill>
+                  <a:gsLst>
+                    <a:gs pos="1250">
+                      <a:srgbClr val="000000"/>
+                    </a:gs>
+                    <a:gs pos="100000">
+                      <a:srgbClr val="000000"/>
+                    </a:gs>
+                  </a:gsLst>
+                  <a:lin ang="5400000" scaled="0"/>
+                </a:gradFill>
+                <a:latin typeface="Consolas" panose="020B0609020204030204" pitchFamily="49" charset="0"/>
+                <a:cs typeface="Consolas" panose="020B0609020204030204" pitchFamily="49" charset="0"/>
+              </a:defRPr>
+            </a:lvl3pPr>
+            <a:lvl4pPr marL="814406" indent="0">
+              <a:buNone/>
+              <a:defRPr sz="1428">
+                <a:gradFill>
+                  <a:gsLst>
+                    <a:gs pos="1250">
+                      <a:srgbClr val="000000"/>
+                    </a:gs>
+                    <a:gs pos="100000">
+                      <a:srgbClr val="000000"/>
+                    </a:gs>
+                  </a:gsLst>
+                  <a:lin ang="5400000" scaled="0"/>
+                </a:gradFill>
+                <a:latin typeface="Consolas" panose="020B0609020204030204" pitchFamily="49" charset="0"/>
+                <a:cs typeface="Consolas" panose="020B0609020204030204" pitchFamily="49" charset="0"/>
+              </a:defRPr>
+            </a:lvl4pPr>
+            <a:lvl5pPr marL="1050795" indent="0">
+              <a:buNone/>
+              <a:defRPr sz="1428">
+                <a:gradFill>
+                  <a:gsLst>
+                    <a:gs pos="1250">
+                      <a:srgbClr val="000000"/>
+                    </a:gs>
+                    <a:gs pos="100000">
+                      <a:srgbClr val="000000"/>
+                    </a:gs>
+                  </a:gsLst>
+                  <a:lin ang="5400000" scaled="0"/>
+                </a:gradFill>
+                <a:latin typeface="Consolas" panose="020B0609020204030204" pitchFamily="49" charset="0"/>
+                <a:cs typeface="Consolas" panose="020B0609020204030204" pitchFamily="49" charset="0"/>
+              </a:defRPr>
+            </a:lvl5pPr>
+          </a:lstStyle>
+          <a:p>
+            <a:pPr lvl="0"/>
+            <a:r>
+              <a:rPr lang="en-US" dirty="0"/>
+              <a:t>Edit Master text styles</a:t>
+            </a:r>
+          </a:p>
+          <a:p>
+            <a:pPr lvl="1"/>
+            <a:r>
+              <a:rPr lang="en-US" dirty="0"/>
+              <a:t>Second level</a:t>
+            </a:r>
+          </a:p>
+          <a:p>
+            <a:pPr lvl="2"/>
+            <a:r>
+              <a:rPr lang="en-US" dirty="0"/>
+              <a:t>Third level</a:t>
+            </a:r>
+          </a:p>
+          <a:p>
+            <a:pPr lvl="3"/>
+            <a:r>
+              <a:rPr lang="en-US" dirty="0"/>
+              <a:t>Fourth level</a:t>
+            </a:r>
+          </a:p>
+          <a:p>
+            <a:pPr lvl="4"/>
+            <a:r>
+              <a:rPr lang="en-US" dirty="0"/>
+              <a:t>Fifth level</a:t>
+            </a:r>
+          </a:p>
+        </p:txBody>
+      </p:sp>
+      <p:sp>
+        <p:nvSpPr>
+          <p:cNvPr id="4" name="Rectangle 3"/>
+          <p:cNvSpPr/>
+          <p:nvPr userDrawn="1"/>
+        </p:nvSpPr>
+        <p:spPr bwMode="auto">
+          <a:xfrm>
+            <a:off x="7663525" y="0"/>
+            <a:ext cx="4772949" cy="6994525"/>
+          </a:xfrm>
+          <a:prstGeom prst="rect">
+            <a:avLst/>
+          </a:prstGeom>
+          <a:solidFill>
+            <a:schemeClr val="accent1"/>
+          </a:solidFill>
+          <a:ln>
+            <a:noFill/>
+            <a:headEnd type="none" w="med" len="med"/>
+            <a:tailEnd type="none" w="med" len="med"/>
+          </a:ln>
+          <a:effectLst/>
+        </p:spPr>
+        <p:style>
+          <a:lnRef idx="1">
+            <a:schemeClr val="accent2"/>
+          </a:lnRef>
+          <a:fillRef idx="3">
+            <a:schemeClr val="accent2"/>
+          </a:fillRef>
+          <a:effectRef idx="2">
+            <a:schemeClr val="accent2"/>
+          </a:effectRef>
+          <a:fontRef idx="minor">
+            <a:schemeClr val="lt1"/>
+          </a:fontRef>
+        </p:style>
+        <p:txBody>
+          <a:bodyPr rot="0" spcFirstLastPara="0" vertOverflow="overflow" horzOverflow="overflow" vert="horz" wrap="square" lIns="186521" tIns="149217" rIns="186521" bIns="149217" numCol="1" spcCol="0" rtlCol="0" fromWordArt="0" anchor="t" anchorCtr="0" forceAA="0" compatLnSpc="1">
+            <a:prstTxWarp prst="textNoShape">
+              <a:avLst/>
+            </a:prstTxWarp>
+            <a:noAutofit/>
+          </a:bodyPr>
+          <a:lstStyle/>
+          <a:p>
+            <a:pPr algn="ctr" defTabSz="951028" fontAlgn="base">
+              <a:lnSpc>
+                <a:spcPct val="90000"/>
+              </a:lnSpc>
+              <a:spcBef>
+                <a:spcPct val="0"/>
+              </a:spcBef>
+              <a:spcAft>
+                <a:spcPct val="0"/>
+              </a:spcAft>
+            </a:pPr>
+            <a:endParaRPr lang="en-US" sz="2448" dirty="0">
+              <a:gradFill>
+                <a:gsLst>
+                  <a:gs pos="0">
+                    <a:srgbClr val="FFFFFF"/>
+                  </a:gs>
+                  <a:gs pos="100000">
+                    <a:srgbClr val="FFFFFF"/>
+                  </a:gs>
+                </a:gsLst>
+                <a:lin ang="5400000" scaled="0"/>
+              </a:gradFill>
+              <a:ea typeface="Segoe UI" pitchFamily="34" charset="0"/>
+              <a:cs typeface="Segoe UI" pitchFamily="34" charset="0"/>
+            </a:endParaRPr>
+          </a:p>
+        </p:txBody>
+      </p:sp>
+      <p:sp>
+        <p:nvSpPr>
+          <p:cNvPr id="8" name="Content Placeholder 7"/>
+          <p:cNvSpPr>
+            <a:spLocks noGrp="1"/>
+          </p:cNvSpPr>
+          <p:nvPr>
+            <p:ph sz="quarter" idx="11"/>
+          </p:nvPr>
+        </p:nvSpPr>
+        <p:spPr>
+          <a:xfrm>
+            <a:off x="8013688" y="295275"/>
+            <a:ext cx="4111875" cy="2162796"/>
+          </a:xfrm>
+        </p:spPr>
+        <p:txBody>
+          <a:bodyPr/>
+          <a:lstStyle>
+            <a:lvl1pPr marL="0" indent="0">
+              <a:buNone/>
+              <a:defRPr sz="3264">
+                <a:solidFill>
+                  <a:schemeClr val="bg1"/>
+                </a:solidFill>
+                <a:latin typeface="+mn-lt"/>
+              </a:defRPr>
+            </a:lvl1pPr>
+            <a:lvl2pPr marL="342834" indent="0">
+              <a:buNone/>
+              <a:defRPr sz="1836">
+                <a:solidFill>
+                  <a:schemeClr val="bg1"/>
+                </a:solidFill>
+                <a:latin typeface="+mn-lt"/>
+              </a:defRPr>
+            </a:lvl2pPr>
+            <a:lvl3pPr marL="571390" indent="0">
+              <a:buNone/>
+              <a:defRPr sz="1632">
+                <a:solidFill>
+                  <a:schemeClr val="bg1"/>
+                </a:solidFill>
+                <a:latin typeface="+mn-lt"/>
+              </a:defRPr>
+            </a:lvl3pPr>
+            <a:lvl4pPr marL="799946" indent="0">
+              <a:buNone/>
+              <a:defRPr sz="1428">
+                <a:solidFill>
+                  <a:schemeClr val="bg1"/>
+                </a:solidFill>
+                <a:latin typeface="+mn-lt"/>
+              </a:defRPr>
+            </a:lvl4pPr>
+            <a:lvl5pPr marL="1028502" indent="0">
+              <a:buNone/>
+              <a:defRPr sz="1428">
+                <a:solidFill>
+                  <a:schemeClr val="bg1"/>
+                </a:solidFill>
+                <a:latin typeface="+mn-lt"/>
+              </a:defRPr>
+            </a:lvl5pPr>
+          </a:lstStyle>
+          <a:p>
+            <a:pPr lvl="0"/>
+            <a:r>
+              <a:rPr lang="en-US"/>
+              <a:t>Edit Master text styles</a:t>
+            </a:r>
+          </a:p>
+          <a:p>
+            <a:pPr lvl="1"/>
+            <a:r>
+              <a:rPr lang="en-US"/>
+              <a:t>Second level</a:t>
+            </a:r>
+          </a:p>
+          <a:p>
+            <a:pPr lvl="2"/>
+            <a:r>
+              <a:rPr lang="en-US"/>
+              <a:t>Third level</a:t>
+            </a:r>
+          </a:p>
+          <a:p>
+            <a:pPr lvl="3"/>
+            <a:r>
+              <a:rPr lang="en-US"/>
+              <a:t>Fourth level</a:t>
+            </a:r>
+          </a:p>
+          <a:p>
+            <a:pPr lvl="4"/>
+            <a:r>
+              <a:rPr lang="en-US"/>
+              <a:t>Fifth level</a:t>
+            </a:r>
+          </a:p>
+        </p:txBody>
+      </p:sp>
+    </p:spTree>
+    <p:extLst>
+      <p:ext uri="{BB962C8B-B14F-4D97-AF65-F5344CB8AC3E}">
+        <p14:creationId xmlns:p14="http://schemas.microsoft.com/office/powerpoint/2010/main" val="636823428"/>
       </p:ext>
     </p:extLst>
   </p:cSld>
@@ -19363,7 +19938,7 @@
           <a:graphicData uri="http://schemas.openxmlformats.org/presentationml/2006/ole">
             <mc:AlternateContent xmlns:mc="http://schemas.openxmlformats.org/markup-compatibility/2006">
               <mc:Choice xmlns:v="urn:schemas-microsoft-com:vml" Requires="v">
-                <p:oleObj spid="_x0000_s8030" name="think-cell Slide" r:id="rId17" imgW="383" imgH="384" progId="TCLayout.ActiveDocument.1">
+                <p:oleObj spid="_x0000_s8032" name="think-cell Slide" r:id="rId17" imgW="383" imgH="384" progId="TCLayout.ActiveDocument.1">
                   <p:embed/>
                 </p:oleObj>
               </mc:Choice>
@@ -21400,7 +21975,7 @@
           <p:nvPr/>
         </p:nvPicPr>
         <p:blipFill>
-          <a:blip r:embed="rId7"/>
+          <a:blip r:embed="rId8"/>
           <a:stretch>
             <a:fillRect/>
           </a:stretch>
@@ -21424,7 +21999,7 @@
           <p:nvPr userDrawn="1"/>
         </p:nvPicPr>
         <p:blipFill>
-          <a:blip r:embed="rId7"/>
+          <a:blip r:embed="rId8"/>
           <a:stretch>
             <a:fillRect/>
           </a:stretch>
@@ -21453,6 +22028,7 @@
     <p:sldLayoutId id="2147484555" r:id="rId3"/>
     <p:sldLayoutId id="2147484556" r:id="rId4"/>
     <p:sldLayoutId id="2147484557" r:id="rId5"/>
+    <p:sldLayoutId id="2147484558" r:id="rId6"/>
   </p:sldLayoutIdLst>
   <p:transition>
     <p:fade/>
@@ -24012,6 +24588,240 @@
     <p:extLst>
       <p:ext uri="{BB962C8B-B14F-4D97-AF65-F5344CB8AC3E}">
         <p14:creationId xmlns:p14="http://schemas.microsoft.com/office/powerpoint/2010/main" val="3297016951"/>
+      </p:ext>
+    </p:extLst>
+  </p:cSld>
+  <p:clrMapOvr>
+    <a:masterClrMapping/>
+  </p:clrMapOvr>
+  <p:transition>
+    <p:fade/>
+  </p:transition>
+</p:sld>
+</file>
+
+<file path=ppt/slides/slide9.xml><?xml version="1.0" encoding="utf-8"?>
+<p:sld xmlns:a="http://schemas.openxmlformats.org/drawingml/2006/main" xmlns:r="http://schemas.openxmlformats.org/officeDocument/2006/relationships" xmlns:p="http://schemas.openxmlformats.org/presentationml/2006/main">
+  <p:cSld>
+    <p:spTree>
+      <p:nvGrpSpPr>
+        <p:cNvPr id="1" name=""/>
+        <p:cNvGrpSpPr/>
+        <p:nvPr/>
+      </p:nvGrpSpPr>
+      <p:grpSpPr>
+        <a:xfrm>
+          <a:off x="0" y="0"/>
+          <a:ext cx="0" cy="0"/>
+          <a:chOff x="0" y="0"/>
+          <a:chExt cx="0" cy="0"/>
+        </a:xfrm>
+      </p:grpSpPr>
+      <p:sp>
+        <p:nvSpPr>
+          <p:cNvPr id="2" name="Title 1">
+            <a:extLst>
+              <a:ext uri="{FF2B5EF4-FFF2-40B4-BE49-F238E27FC236}">
+                <a16:creationId xmlns:a16="http://schemas.microsoft.com/office/drawing/2014/main" id="{09860494-B323-43FA-9F87-1B55842D0879}"/>
+              </a:ext>
+            </a:extLst>
+          </p:cNvPr>
+          <p:cNvSpPr>
+            <a:spLocks noGrp="1"/>
+          </p:cNvSpPr>
+          <p:nvPr>
+            <p:ph type="title"/>
+          </p:nvPr>
+        </p:nvSpPr>
+        <p:spPr>
+          <a:xfrm>
+            <a:off x="0" y="917885"/>
+            <a:ext cx="7114249" cy="917575"/>
+          </a:xfrm>
+        </p:spPr>
+        <p:txBody>
+          <a:bodyPr>
+            <a:noAutofit/>
+          </a:bodyPr>
+          <a:lstStyle/>
+          <a:p>
+            <a:pPr algn="ctr"/>
+            <a:br>
+              <a:rPr lang="en-US" sz="7000" spc="-102" dirty="0">
+                <a:ln w="3175">
+                  <a:noFill/>
+                </a:ln>
+                <a:gradFill>
+                  <a:gsLst>
+                    <a:gs pos="1250">
+                      <a:schemeClr val="tx1"/>
+                    </a:gs>
+                    <a:gs pos="100000">
+                      <a:schemeClr val="tx1"/>
+                    </a:gs>
+                  </a:gsLst>
+                  <a:lin ang="5400000" scaled="0"/>
+                </a:gradFill>
+                <a:latin typeface="+mn-lt"/>
+                <a:ea typeface="+mn-ea"/>
+                <a:cs typeface="Segoe UI" pitchFamily="34" charset="0"/>
+              </a:rPr>
+            </a:br>
+            <a:r>
+              <a:rPr lang="en-US" sz="7200" b="1" dirty="0"/>
+              <a:t>LAB: </a:t>
+            </a:r>
+            <a:br>
+              <a:rPr lang="en-US" sz="7000" spc="-102" dirty="0">
+                <a:ln w="3175">
+                  <a:noFill/>
+                </a:ln>
+                <a:gradFill>
+                  <a:gsLst>
+                    <a:gs pos="1250">
+                      <a:schemeClr val="tx1"/>
+                    </a:gs>
+                    <a:gs pos="100000">
+                      <a:schemeClr val="tx1"/>
+                    </a:gs>
+                  </a:gsLst>
+                  <a:lin ang="5400000" scaled="0"/>
+                </a:gradFill>
+                <a:latin typeface="+mn-lt"/>
+                <a:ea typeface="+mn-ea"/>
+                <a:cs typeface="Segoe UI" pitchFamily="34" charset="0"/>
+              </a:rPr>
+            </a:br>
+            <a:r>
+              <a:rPr lang="en-US" sz="7200" b="1" dirty="0" err="1"/>
+              <a:t>BotsLoggingLab</a:t>
+            </a:r>
+            <a:br>
+              <a:rPr lang="en-US" sz="7200" dirty="0"/>
+            </a:br>
+            <a:endParaRPr lang="en-US" sz="7000" dirty="0">
+              <a:latin typeface="+mn-lt"/>
+            </a:endParaRPr>
+          </a:p>
+        </p:txBody>
+      </p:sp>
+      <p:sp>
+        <p:nvSpPr>
+          <p:cNvPr id="4" name="Content Placeholder 3">
+            <a:extLst>
+              <a:ext uri="{FF2B5EF4-FFF2-40B4-BE49-F238E27FC236}">
+                <a16:creationId xmlns:a16="http://schemas.microsoft.com/office/drawing/2014/main" id="{6C54C80F-1BBA-40C4-B39C-2506D16142FC}"/>
+              </a:ext>
+            </a:extLst>
+          </p:cNvPr>
+          <p:cNvSpPr>
+            <a:spLocks noGrp="1"/>
+          </p:cNvSpPr>
+          <p:nvPr>
+            <p:ph sz="quarter" idx="11"/>
+          </p:nvPr>
+        </p:nvSpPr>
+        <p:spPr/>
+        <p:txBody>
+          <a:bodyPr/>
+          <a:lstStyle/>
+          <a:p>
+            <a:endParaRPr lang="en-US"/>
+          </a:p>
+        </p:txBody>
+      </p:sp>
+      <p:pic>
+        <p:nvPicPr>
+          <p:cNvPr id="5" name="Picture 4">
+            <a:extLst>
+              <a:ext uri="{FF2B5EF4-FFF2-40B4-BE49-F238E27FC236}">
+                <a16:creationId xmlns:a16="http://schemas.microsoft.com/office/drawing/2014/main" id="{7BD728B5-9D75-462C-A194-C721431C3AD2}"/>
+              </a:ext>
+            </a:extLst>
+          </p:cNvPr>
+          <p:cNvPicPr>
+            <a:picLocks noChangeAspect="1"/>
+          </p:cNvPicPr>
+          <p:nvPr/>
+        </p:nvPicPr>
+        <p:blipFill>
+          <a:blip r:embed="rId3"/>
+          <a:stretch>
+            <a:fillRect/>
+          </a:stretch>
+        </p:blipFill>
+        <p:spPr>
+          <a:xfrm>
+            <a:off x="7215764" y="295275"/>
+            <a:ext cx="5225184" cy="6075506"/>
+          </a:xfrm>
+          <a:prstGeom prst="rect">
+            <a:avLst/>
+          </a:prstGeom>
+        </p:spPr>
+      </p:pic>
+      <p:pic>
+        <p:nvPicPr>
+          <p:cNvPr id="6" name="Picture 5">
+            <a:extLst>
+              <a:ext uri="{FF2B5EF4-FFF2-40B4-BE49-F238E27FC236}">
+                <a16:creationId xmlns:a16="http://schemas.microsoft.com/office/drawing/2014/main" id="{DD537BC3-5083-4E84-92CA-B19BAC962B6C}"/>
+              </a:ext>
+            </a:extLst>
+          </p:cNvPr>
+          <p:cNvPicPr>
+            <a:picLocks noChangeAspect="1"/>
+          </p:cNvPicPr>
+          <p:nvPr/>
+        </p:nvPicPr>
+        <p:blipFill rotWithShape="1">
+          <a:blip r:embed="rId3"/>
+          <a:srcRect b="77273"/>
+          <a:stretch/>
+        </p:blipFill>
+        <p:spPr>
+          <a:xfrm>
+            <a:off x="7211291" y="4836092"/>
+            <a:ext cx="5225184" cy="2158433"/>
+          </a:xfrm>
+          <a:prstGeom prst="rect">
+            <a:avLst/>
+          </a:prstGeom>
+        </p:spPr>
+      </p:pic>
+      <p:pic>
+        <p:nvPicPr>
+          <p:cNvPr id="7" name="Picture 6">
+            <a:extLst>
+              <a:ext uri="{FF2B5EF4-FFF2-40B4-BE49-F238E27FC236}">
+                <a16:creationId xmlns:a16="http://schemas.microsoft.com/office/drawing/2014/main" id="{C36949DF-4B2B-4ACD-BE69-5AAD10350B6D}"/>
+              </a:ext>
+            </a:extLst>
+          </p:cNvPr>
+          <p:cNvPicPr>
+            <a:picLocks noChangeAspect="1"/>
+          </p:cNvPicPr>
+          <p:nvPr/>
+        </p:nvPicPr>
+        <p:blipFill rotWithShape="1">
+          <a:blip r:embed="rId3"/>
+          <a:srcRect b="77273"/>
+          <a:stretch/>
+        </p:blipFill>
+        <p:spPr>
+          <a:xfrm>
+            <a:off x="7211291" y="1"/>
+            <a:ext cx="5225184" cy="1744662"/>
+          </a:xfrm>
+          <a:prstGeom prst="rect">
+            <a:avLst/>
+          </a:prstGeom>
+        </p:spPr>
+      </p:pic>
+    </p:spTree>
+    <p:extLst>
+      <p:ext uri="{BB962C8B-B14F-4D97-AF65-F5344CB8AC3E}">
+        <p14:creationId xmlns:p14="http://schemas.microsoft.com/office/powerpoint/2010/main" val="3640612168"/>
       </p:ext>
     </p:extLst>
   </p:cSld>
@@ -26694,6 +27504,15 @@
 </file>
 
 <file path=customXml/item1.xml><?xml version="1.0" encoding="utf-8"?>
+<?mso-contentType ?>
+<FormTemplates xmlns="http://schemas.microsoft.com/sharepoint/v3/contenttype/forms">
+  <Display>DocumentLibraryForm</Display>
+  <Edit>DocumentLibraryForm</Edit>
+  <New>DocumentLibraryForm</New>
+</FormTemplates>
+</file>
+
+<file path=customXml/item2.xml><?xml version="1.0" encoding="utf-8"?>
 <ct:contentTypeSchema xmlns:ct="http://schemas.microsoft.com/office/2006/metadata/contentType" xmlns:ma="http://schemas.microsoft.com/office/2006/metadata/properties/metaAttributes" ct:_="" ma:_="" ma:contentTypeName="Document" ma:contentTypeID="0x0101009D79205F35F1AF40BCD07C4F58D4AC80" ma:contentTypeVersion="6" ma:contentTypeDescription="Create a new document." ma:contentTypeScope="" ma:versionID="a386001cfb475e71d9c289d83f4224ff">
   <xsd:schema xmlns:xsd="http://www.w3.org/2001/XMLSchema" xmlns:xs="http://www.w3.org/2001/XMLSchema" xmlns:p="http://schemas.microsoft.com/office/2006/metadata/properties" xmlns:ns1="http://schemas.microsoft.com/sharepoint/v3" xmlns:ns2="9bc6b55d-a734-43bd-8eab-fb065c703cf5" targetNamespace="http://schemas.microsoft.com/office/2006/metadata/properties" ma:root="true" ma:fieldsID="56d52bee22a2d005e8866caae1afc15c" ns1:_="" ns2:_="">
     <xsd:import namespace="http://schemas.microsoft.com/sharepoint/v3"/>
@@ -26872,15 +27691,6 @@
 </ct:contentTypeSchema>
 </file>
 
-<file path=customXml/item2.xml><?xml version="1.0" encoding="utf-8"?>
-<?mso-contentType ?>
-<FormTemplates xmlns="http://schemas.microsoft.com/sharepoint/v3/contenttype/forms">
-  <Display>DocumentLibraryForm</Display>
-  <Edit>DocumentLibraryForm</Edit>
-  <New>DocumentLibraryForm</New>
-</FormTemplates>
-</file>
-
 <file path=customXml/item3.xml><?xml version="1.0" encoding="utf-8"?>
 <p:properties xmlns:p="http://schemas.microsoft.com/office/2006/metadata/properties" xmlns:xsi="http://www.w3.org/2001/XMLSchema-instance" xmlns:pc="http://schemas.microsoft.com/office/infopath/2007/PartnerControls">
   <documentManagement>
@@ -26891,6 +27701,14 @@
 </file>
 
 <file path=customXml/itemProps1.xml><?xml version="1.0" encoding="utf-8"?>
+<ds:datastoreItem xmlns:ds="http://schemas.openxmlformats.org/officeDocument/2006/customXml" ds:itemID="{95CB9E75-A460-42D0-BC11-EC531E59AB28}">
+  <ds:schemaRefs>
+    <ds:schemaRef ds:uri="http://schemas.microsoft.com/sharepoint/v3/contenttype/forms"/>
+  </ds:schemaRefs>
+</ds:datastoreItem>
+</file>
+
+<file path=customXml/itemProps2.xml><?xml version="1.0" encoding="utf-8"?>
 <ds:datastoreItem xmlns:ds="http://schemas.openxmlformats.org/officeDocument/2006/customXml" ds:itemID="{A5C990B1-552C-4BC2-8F55-9992DEBD02C0}">
   <ds:schemaRefs>
     <ds:schemaRef ds:uri="http://schemas.microsoft.com/office/2006/metadata/contentType"/>
@@ -26905,14 +27723,6 @@
     <ds:schemaRef ds:uri="http://purl.org/dc/elements/1.1/"/>
     <ds:schemaRef ds:uri="http://purl.org/dc/terms/"/>
     <ds:schemaRef ds:uri="http://schemas.microsoft.com/internal/obd"/>
-  </ds:schemaRefs>
-</ds:datastoreItem>
-</file>
-
-<file path=customXml/itemProps2.xml><?xml version="1.0" encoding="utf-8"?>
-<ds:datastoreItem xmlns:ds="http://schemas.openxmlformats.org/officeDocument/2006/customXml" ds:itemID="{95CB9E75-A460-42D0-BC11-EC531E59AB28}">
-  <ds:schemaRefs>
-    <ds:schemaRef ds:uri="http://schemas.microsoft.com/sharepoint/v3/contenttype/forms"/>
   </ds:schemaRefs>
 </ds:datastoreItem>
 </file>

</xml_diff>